<commit_message>
Fix bugs and update presentation
</commit_message>
<xml_diff>
--- a/outputs/report/Computational Efficiency in EWS for Financial Credit Risk.pptx
+++ b/outputs/report/Computational Efficiency in EWS for Financial Credit Risk.pptx
@@ -3397,7 +3397,7 @@
           <a:p>
             <a:fld id="{AE1A2783-BA6E-3643-86F6-158DC658B57E}" type="datetimeFigureOut">
               <a:rPr lang="en-SA" smtClean="0"/>
-              <a:t>08/12/2024 R</a:t>
+              <a:t>13/12/2024 R</a:t>
             </a:fld>
             <a:endParaRPr lang="en-SA"/>
           </a:p>
@@ -3937,7 +3937,7 @@
           <a:p>
             <a:fld id="{4798095F-5BC5-674A-8200-9DDBB9D0AB15}" type="datetime2">
               <a:rPr lang="en-US" smtClean="0"/>
-              <a:t>Sunday, December 8, 2024</a:t>
+              <a:t>Friday, December 13, 2024</a:t>
             </a:fld>
             <a:endParaRPr lang="en-SA" dirty="0"/>
           </a:p>
@@ -4592,7 +4592,7 @@
           <a:p>
             <a:fld id="{5F7E73D2-1897-D542-A159-591C121DF78E}" type="datetime2">
               <a:rPr lang="en-US" smtClean="0"/>
-              <a:t>Sunday, December 8, 2024</a:t>
+              <a:t>Friday, December 13, 2024</a:t>
             </a:fld>
             <a:endParaRPr lang="en-SA"/>
           </a:p>
@@ -4964,7 +4964,7 @@
           <a:p>
             <a:fld id="{B70F6302-5245-474B-B333-3B8FA0197DBD}" type="datetime2">
               <a:rPr lang="en-US" smtClean="0"/>
-              <a:t>Sunday, December 8, 2024</a:t>
+              <a:t>Friday, December 13, 2024</a:t>
             </a:fld>
             <a:endParaRPr lang="en-SA"/>
           </a:p>
@@ -5324,7 +5324,7 @@
           <a:p>
             <a:fld id="{6E13A63C-5BE3-854B-B9E9-0C42235FFC5E}" type="datetime2">
               <a:rPr lang="en-US" smtClean="0"/>
-              <a:t>Sunday, December 8, 2024</a:t>
+              <a:t>Friday, December 13, 2024</a:t>
             </a:fld>
             <a:endParaRPr lang="en-SA"/>
           </a:p>
@@ -5532,7 +5532,7 @@
           <a:p>
             <a:fld id="{42441481-26AA-A44E-9506-94E99090F046}" type="datetime2">
               <a:rPr lang="en-US" smtClean="0"/>
-              <a:t>Sunday, December 8, 2024</a:t>
+              <a:t>Friday, December 13, 2024</a:t>
             </a:fld>
             <a:endParaRPr lang="en-SA"/>
           </a:p>
@@ -5699,7 +5699,7 @@
           <a:p>
             <a:fld id="{97547EDF-EC7D-8544-A1B9-6756C349E617}" type="datetime2">
               <a:rPr lang="en-US" smtClean="0"/>
-              <a:t>Sunday, December 8, 2024</a:t>
+              <a:t>Friday, December 13, 2024</a:t>
             </a:fld>
             <a:endParaRPr lang="en-SA"/>
           </a:p>
@@ -5924,7 +5924,7 @@
           <a:p>
             <a:fld id="{92D11887-3DCC-2349-82E2-11EADB8A062B}" type="datetime2">
               <a:rPr lang="en-US" smtClean="0"/>
-              <a:t>Sunday, December 8, 2024</a:t>
+              <a:t>Friday, December 13, 2024</a:t>
             </a:fld>
             <a:endParaRPr lang="en-SA"/>
           </a:p>
@@ -6295,7 +6295,7 @@
           <a:p>
             <a:fld id="{7F9A6169-DD39-F54E-8D4D-C9C5C68F5A4C}" type="datetime2">
               <a:rPr lang="en-US" smtClean="0"/>
-              <a:t>Sunday, December 8, 2024</a:t>
+              <a:t>Friday, December 13, 2024</a:t>
             </a:fld>
             <a:endParaRPr lang="en-SA"/>
           </a:p>
@@ -6515,7 +6515,7 @@
           <a:p>
             <a:fld id="{5F7E73D2-1897-D542-A159-591C121DF78E}" type="datetime2">
               <a:rPr lang="en-US" smtClean="0"/>
-              <a:t>Sunday, December 8, 2024</a:t>
+              <a:t>Friday, December 13, 2024</a:t>
             </a:fld>
             <a:endParaRPr lang="en-SA"/>
           </a:p>
@@ -6741,7 +6741,7 @@
           <a:p>
             <a:fld id="{5F7E73D2-1897-D542-A159-591C121DF78E}" type="datetime2">
               <a:rPr lang="en-US" smtClean="0"/>
-              <a:t>Sunday, December 8, 2024</a:t>
+              <a:t>Friday, December 13, 2024</a:t>
             </a:fld>
             <a:endParaRPr lang="en-SA"/>
           </a:p>
@@ -7057,7 +7057,7 @@
           <a:p>
             <a:fld id="{5F7E73D2-1897-D542-A159-591C121DF78E}" type="datetime2">
               <a:rPr lang="en-US" smtClean="0"/>
-              <a:t>Sunday, December 8, 2024</a:t>
+              <a:t>Friday, December 13, 2024</a:t>
             </a:fld>
             <a:endParaRPr lang="en-SA"/>
           </a:p>
@@ -7288,7 +7288,7 @@
           <a:p>
             <a:fld id="{5F7E73D2-1897-D542-A159-591C121DF78E}" type="datetime2">
               <a:rPr lang="en-US" smtClean="0"/>
-              <a:t>Sunday, December 8, 2024</a:t>
+              <a:t>Friday, December 13, 2024</a:t>
             </a:fld>
             <a:endParaRPr lang="en-SA"/>
           </a:p>
@@ -7574,7 +7574,7 @@
           <a:p>
             <a:fld id="{340D215E-9528-764A-9FDC-6E9CEAC4B542}" type="datetime2">
               <a:rPr lang="en-US" smtClean="0"/>
-              <a:t>Sunday, December 8, 2024</a:t>
+              <a:t>Friday, December 13, 2024</a:t>
             </a:fld>
             <a:endParaRPr lang="en-SA"/>
           </a:p>
@@ -8221,13 +8221,13 @@
               </a:ext>
             </a:extLst>
           </a:blip>
-          <a:srcRect l="73759"/>
+          <a:srcRect l="73759" r="20394" b="47331"/>
           <a:stretch/>
         </p:blipFill>
         <p:spPr>
           <a:xfrm>
             <a:off x="11479431" y="4651211"/>
-            <a:ext cx="3198009" cy="4189956"/>
+            <a:ext cx="712569" cy="2206789"/>
           </a:xfrm>
           <a:prstGeom prst="rect">
             <a:avLst/>
@@ -9525,6 +9525,36 @@
           <a:chExt cx="0" cy="0"/>
         </a:xfrm>
       </p:grpSpPr>
+      <p:pic>
+        <p:nvPicPr>
+          <p:cNvPr id="3" name="Picture 2" descr="A screenshot of a computer program&#10;&#10;Description automatically generated">
+            <a:extLst>
+              <a:ext uri="{FF2B5EF4-FFF2-40B4-BE49-F238E27FC236}">
+                <a16:creationId xmlns:a16="http://schemas.microsoft.com/office/drawing/2014/main" id="{D68E6267-6A65-98AF-FD85-A88686D95CB2}"/>
+              </a:ext>
+            </a:extLst>
+          </p:cNvPr>
+          <p:cNvPicPr>
+            <a:picLocks noChangeAspect="1"/>
+          </p:cNvPicPr>
+          <p:nvPr/>
+        </p:nvPicPr>
+        <p:blipFill>
+          <a:blip r:embed="rId2"/>
+          <a:stretch>
+            <a:fillRect/>
+          </a:stretch>
+        </p:blipFill>
+        <p:spPr>
+          <a:xfrm>
+            <a:off x="884361" y="2477327"/>
+            <a:ext cx="4249543" cy="3698006"/>
+          </a:xfrm>
+          <a:prstGeom prst="rect">
+            <a:avLst/>
+          </a:prstGeom>
+        </p:spPr>
+      </p:pic>
       <p:sp>
         <p:nvSpPr>
           <p:cNvPr id="4" name="Title 3">
@@ -9571,35 +9601,6 @@
           </a:p>
         </p:txBody>
       </p:sp>
-      <p:pic>
-        <p:nvPicPr>
-          <p:cNvPr id="7" name="Content Placeholder 6" descr="A screenshot of a computer program&#10;&#10;Description automatically generated">
-            <a:extLst>
-              <a:ext uri="{FF2B5EF4-FFF2-40B4-BE49-F238E27FC236}">
-                <a16:creationId xmlns:a16="http://schemas.microsoft.com/office/drawing/2014/main" id="{C27CC780-3AA7-A80C-CAC2-B3C2A10A50DF}"/>
-              </a:ext>
-            </a:extLst>
-          </p:cNvPr>
-          <p:cNvPicPr>
-            <a:picLocks noGrp="1" noChangeAspect="1"/>
-          </p:cNvPicPr>
-          <p:nvPr>
-            <p:ph idx="1"/>
-          </p:nvPr>
-        </p:nvPicPr>
-        <p:blipFill>
-          <a:blip r:embed="rId2"/>
-          <a:stretch>
-            <a:fillRect/>
-          </a:stretch>
-        </p:blipFill>
-        <p:spPr>
-          <a:xfrm>
-            <a:off x="934465" y="2539956"/>
-            <a:ext cx="4070550" cy="3533775"/>
-          </a:xfrm>
-        </p:spPr>
-      </p:pic>
       <p:pic>
         <p:nvPicPr>
           <p:cNvPr id="8" name="Content Placeholder 6">
@@ -9754,8 +9755,8 @@
         </p:nvSpPr>
         <p:spPr>
           <a:xfrm>
-            <a:off x="1112638" y="3105558"/>
-            <a:ext cx="2755028" cy="540000"/>
+            <a:off x="1112637" y="3118084"/>
+            <a:ext cx="2933269" cy="540000"/>
           </a:xfrm>
           <a:prstGeom prst="rect">
             <a:avLst/>
@@ -9806,8 +9807,8 @@
         </p:nvSpPr>
         <p:spPr>
           <a:xfrm>
-            <a:off x="1112638" y="4306843"/>
-            <a:ext cx="2755028" cy="540000"/>
+            <a:off x="1112637" y="4319369"/>
+            <a:ext cx="2933269" cy="540000"/>
           </a:xfrm>
           <a:prstGeom prst="rect">
             <a:avLst/>
@@ -9858,8 +9859,8 @@
         </p:nvSpPr>
         <p:spPr>
           <a:xfrm>
-            <a:off x="1112638" y="5533731"/>
-            <a:ext cx="2755028" cy="540000"/>
+            <a:off x="1112637" y="5546257"/>
+            <a:ext cx="2933269" cy="540000"/>
           </a:xfrm>
           <a:prstGeom prst="rect">
             <a:avLst/>
@@ -10248,17 +10249,9 @@
           </p:nvPr>
         </p:nvPicPr>
         <p:blipFill>
-          <a:blip r:embed="rId2">
-            <a:extLst>
-              <a:ext uri="{28A0092B-C50C-407E-A947-70E740481C1C}">
-                <a14:useLocalDpi xmlns:a14="http://schemas.microsoft.com/office/drawing/2010/main" val="0"/>
-              </a:ext>
-            </a:extLst>
-          </a:blip>
+          <a:blip r:embed="rId2"/>
           <a:srcRect/>
-          <a:stretch>
-            <a:fillRect/>
-          </a:stretch>
+          <a:stretch/>
         </p:blipFill>
         <p:spPr bwMode="auto">
           <a:xfrm>
@@ -10386,17 +10379,9 @@
           </p:nvPr>
         </p:nvPicPr>
         <p:blipFill>
-          <a:blip r:embed="rId2">
-            <a:extLst>
-              <a:ext uri="{28A0092B-C50C-407E-A947-70E740481C1C}">
-                <a14:useLocalDpi xmlns:a14="http://schemas.microsoft.com/office/drawing/2010/main" val="0"/>
-              </a:ext>
-            </a:extLst>
-          </a:blip>
+          <a:blip r:embed="rId2"/>
           <a:srcRect/>
-          <a:stretch>
-            <a:fillRect/>
-          </a:stretch>
+          <a:stretch/>
         </p:blipFill>
         <p:spPr bwMode="auto">
           <a:xfrm>
@@ -10524,17 +10509,9 @@
           </p:nvPr>
         </p:nvPicPr>
         <p:blipFill>
-          <a:blip r:embed="rId2">
-            <a:extLst>
-              <a:ext uri="{28A0092B-C50C-407E-A947-70E740481C1C}">
-                <a14:useLocalDpi xmlns:a14="http://schemas.microsoft.com/office/drawing/2010/main" val="0"/>
-              </a:ext>
-            </a:extLst>
-          </a:blip>
+          <a:blip r:embed="rId2"/>
           <a:srcRect/>
-          <a:stretch>
-            <a:fillRect/>
-          </a:stretch>
+          <a:stretch/>
         </p:blipFill>
         <p:spPr bwMode="auto">
           <a:xfrm>
@@ -10651,7 +10628,7 @@
         <p:spPr>
           <a:xfrm>
             <a:off x="838198" y="2643807"/>
-            <a:ext cx="9195487" cy="3533156"/>
+            <a:ext cx="9474202" cy="3533156"/>
           </a:xfrm>
         </p:spPr>
         <p:txBody>
@@ -10686,7 +10663,7 @@
             </a:r>
             <a:r>
               <a:rPr lang="en-US" dirty="0"/>
-              <a:t>: Best performer for speed and memory efficiency.</a:t>
+              <a:t>: Significant speed improvement, ideal for time-sensitive tasks, needs more effort to overcome non-square and non-positive definite cases.</a:t>
             </a:r>
           </a:p>
           <a:p>
@@ -10703,7 +10680,7 @@
             </a:r>
             <a:r>
               <a:rPr lang="en-US" dirty="0"/>
-              <a:t>: Suitable for dimensionality reduction.</a:t>
+              <a:t>: Efficient in both time and memory. It is suitable for lightweight operations. </a:t>
             </a:r>
           </a:p>
           <a:p>
@@ -10720,7 +10697,7 @@
             </a:r>
             <a:r>
               <a:rPr lang="en-US" dirty="0"/>
-              <a:t>: Computationally expensive compared to PCA and Cholesky.</a:t>
+              <a:t>: Efficient in time, but high memory usage. It is suitable heavy operations where accuracy is a must.</a:t>
             </a:r>
             <a:endParaRPr lang="en-SA" dirty="0"/>
           </a:p>
@@ -10839,7 +10816,7 @@
             </a:pPr>
             <a:r>
               <a:rPr lang="en-US" dirty="0"/>
-              <a:t>Don’t unintimate optimization, so replacing naïve approaches, with like with optimized techniques like Cholesky decomposition drastically improves performance.</a:t>
+              <a:t>Don’t unintimate optimization, so replacing naïve approaches, with like with optimized techniques like PCA decomposition drastically improves performance.</a:t>
             </a:r>
           </a:p>
           <a:p>
@@ -13214,7 +13191,7 @@
           <p:nvPr>
             <p:extLst>
               <p:ext uri="{D42A27DB-BD31-4B8C-83A1-F6EECF244321}">
-                <p14:modId xmlns:p14="http://schemas.microsoft.com/office/powerpoint/2010/main" val="2626120674"/>
+                <p14:modId xmlns:p14="http://schemas.microsoft.com/office/powerpoint/2010/main" val="612986515"/>
               </p:ext>
             </p:extLst>
           </p:nvPr>
@@ -13435,14 +13412,14 @@
                     <a:p>
                       <a:pPr algn="l" fontAlgn="b"/>
                       <a:r>
-                        <a:rPr lang="en-SA" sz="800" b="0" i="0" u="none" strike="noStrike">
+                        <a:rPr lang="en-SA" sz="800" b="0" i="0" u="none" strike="noStrike" dirty="0">
                           <a:solidFill>
                             <a:srgbClr val="000000"/>
                           </a:solidFill>
                           <a:effectLst/>
                           <a:latin typeface="Aptos Narrow" panose="020B0004020202020204" pitchFamily="34" charset="0"/>
                         </a:rPr>
-                        <a:t>0-1.5</a:t>
+                        <a:t>0.01-1.5</a:t>
                       </a:r>
                     </a:p>
                   </a:txBody>
@@ -13510,14 +13487,14 @@
                     <a:p>
                       <a:pPr algn="l" fontAlgn="b"/>
                       <a:r>
-                        <a:rPr lang="en-SA" sz="800" b="0" i="0" u="none" strike="noStrike">
+                        <a:rPr lang="en-SA" sz="800" b="0" i="0" u="none" strike="noStrike" dirty="0">
                           <a:solidFill>
                             <a:srgbClr val="000000"/>
                           </a:solidFill>
                           <a:effectLst/>
                           <a:latin typeface="Aptos Narrow" panose="020B0004020202020204" pitchFamily="34" charset="0"/>
                         </a:rPr>
-                        <a:t>0-1.5</a:t>
+                        <a:t>0.01-1.5</a:t>
                       </a:r>
                     </a:p>
                   </a:txBody>
@@ -13585,14 +13562,14 @@
                     <a:p>
                       <a:pPr algn="l" fontAlgn="b"/>
                       <a:r>
-                        <a:rPr lang="en-SA" sz="800" b="0" i="0" u="none" strike="noStrike">
+                        <a:rPr lang="en-SA" sz="800" b="0" i="0" u="none" strike="noStrike" dirty="0">
                           <a:solidFill>
                             <a:srgbClr val="000000"/>
                           </a:solidFill>
                           <a:effectLst/>
                           <a:latin typeface="Aptos Narrow" panose="020B0004020202020204" pitchFamily="34" charset="0"/>
                         </a:rPr>
-                        <a:t>0-1.5</a:t>
+                        <a:t>0.01-1.5</a:t>
                       </a:r>
                     </a:p>
                   </a:txBody>
@@ -13660,7 +13637,7 @@
                     <a:p>
                       <a:pPr algn="l" fontAlgn="b"/>
                       <a:r>
-                        <a:rPr lang="en-SA" sz="800" b="0" i="0" u="none" strike="noStrike">
+                        <a:rPr lang="en-SA" sz="800" b="0" i="0" u="none" strike="noStrike" dirty="0">
                           <a:solidFill>
                             <a:srgbClr val="000000"/>
                           </a:solidFill>
@@ -13735,7 +13712,7 @@
                     <a:p>
                       <a:pPr algn="l" fontAlgn="b"/>
                       <a:r>
-                        <a:rPr lang="en-SA" sz="800" b="0" i="0" u="none" strike="noStrike">
+                        <a:rPr lang="en-SA" sz="800" b="0" i="0" u="none" strike="noStrike" dirty="0">
                           <a:solidFill>
                             <a:srgbClr val="000000"/>
                           </a:solidFill>
@@ -13810,7 +13787,7 @@
                     <a:p>
                       <a:pPr algn="l" fontAlgn="b"/>
                       <a:r>
-                        <a:rPr lang="en-SA" sz="800" b="0" i="0" u="none" strike="noStrike">
+                        <a:rPr lang="en-SA" sz="800" b="0" i="0" u="none" strike="noStrike" dirty="0">
                           <a:solidFill>
                             <a:srgbClr val="000000"/>
                           </a:solidFill>
@@ -13885,7 +13862,7 @@
                     <a:p>
                       <a:pPr algn="l" fontAlgn="b"/>
                       <a:r>
-                        <a:rPr lang="en-SA" sz="800" b="0" i="0" u="none" strike="noStrike">
+                        <a:rPr lang="en-SA" sz="800" b="0" i="0" u="none" strike="noStrike" dirty="0">
                           <a:solidFill>
                             <a:srgbClr val="000000"/>
                           </a:solidFill>
@@ -13960,7 +13937,7 @@
                     <a:p>
                       <a:pPr algn="l" fontAlgn="b"/>
                       <a:r>
-                        <a:rPr lang="en-SA" sz="800" b="0" i="0" u="none" strike="noStrike">
+                        <a:rPr lang="en-SA" sz="800" b="0" i="0" u="none" strike="noStrike" dirty="0">
                           <a:solidFill>
                             <a:srgbClr val="000000"/>
                           </a:solidFill>
@@ -14035,14 +14012,14 @@
                     <a:p>
                       <a:pPr algn="l" fontAlgn="b"/>
                       <a:r>
-                        <a:rPr lang="en-SA" sz="800" b="0" i="0" u="none" strike="noStrike">
+                        <a:rPr lang="en-SA" sz="800" b="0" i="0" u="none" strike="noStrike" dirty="0">
                           <a:solidFill>
                             <a:srgbClr val="000000"/>
                           </a:solidFill>
                           <a:effectLst/>
                           <a:latin typeface="Aptos Narrow" panose="020B0004020202020204" pitchFamily="34" charset="0"/>
                         </a:rPr>
-                        <a:t>$0 - $1,000,000+</a:t>
+                        <a:t>$0.01 - $1,000,000+</a:t>
                       </a:r>
                     </a:p>
                   </a:txBody>
@@ -14110,14 +14087,14 @@
                     <a:p>
                       <a:pPr algn="l" fontAlgn="b"/>
                       <a:r>
-                        <a:rPr lang="en-SA" sz="800" b="0" i="0" u="none" strike="noStrike">
+                        <a:rPr lang="en-SA" sz="800" b="0" i="0" u="none" strike="noStrike" dirty="0">
                           <a:solidFill>
                             <a:srgbClr val="000000"/>
                           </a:solidFill>
                           <a:effectLst/>
                           <a:latin typeface="Aptos Narrow" panose="020B0004020202020204" pitchFamily="34" charset="0"/>
                         </a:rPr>
-                        <a:t>$0 - $1,000,000+</a:t>
+                        <a:t>$0.01 - $1,000,000+</a:t>
                       </a:r>
                     </a:p>
                   </a:txBody>
@@ -14185,14 +14162,14 @@
                     <a:p>
                       <a:pPr algn="l" fontAlgn="b"/>
                       <a:r>
-                        <a:rPr lang="en-SA" sz="800" b="0" i="0" u="none" strike="noStrike">
+                        <a:rPr lang="en-SA" sz="800" b="0" i="0" u="none" strike="noStrike" dirty="0">
                           <a:solidFill>
                             <a:srgbClr val="000000"/>
                           </a:solidFill>
                           <a:effectLst/>
                           <a:latin typeface="Aptos Narrow" panose="020B0004020202020204" pitchFamily="34" charset="0"/>
                         </a:rPr>
-                        <a:t>$0 - $500,000+</a:t>
+                        <a:t>$0.01- $500,000+</a:t>
                       </a:r>
                     </a:p>
                   </a:txBody>
@@ -14260,14 +14237,14 @@
                     <a:p>
                       <a:pPr algn="l" fontAlgn="b"/>
                       <a:r>
-                        <a:rPr lang="en-SA" sz="800" b="0" i="0" u="none" strike="noStrike">
+                        <a:rPr lang="en-SA" sz="800" b="0" i="0" u="none" strike="noStrike" dirty="0">
                           <a:solidFill>
                             <a:srgbClr val="000000"/>
                           </a:solidFill>
                           <a:effectLst/>
                           <a:latin typeface="Aptos Narrow" panose="020B0004020202020204" pitchFamily="34" charset="0"/>
                         </a:rPr>
-                        <a:t>0 - 2+</a:t>
+                        <a:t>0.01 - 2+</a:t>
                       </a:r>
                     </a:p>
                   </a:txBody>
@@ -14335,14 +14312,14 @@
                     <a:p>
                       <a:pPr algn="l" fontAlgn="b"/>
                       <a:r>
-                        <a:rPr lang="en-SA" sz="800" b="0" i="0" u="none" strike="noStrike">
+                        <a:rPr lang="en-SA" sz="800" b="0" i="0" u="none" strike="noStrike" dirty="0">
                           <a:solidFill>
                             <a:srgbClr val="000000"/>
                           </a:solidFill>
                           <a:effectLst/>
                           <a:latin typeface="Aptos Narrow" panose="020B0004020202020204" pitchFamily="34" charset="0"/>
                         </a:rPr>
-                        <a:t>0 - 12+</a:t>
+                        <a:t>0.01 - 12+</a:t>
                       </a:r>
                     </a:p>
                   </a:txBody>
@@ -14410,14 +14387,14 @@
                     <a:p>
                       <a:pPr algn="l" fontAlgn="b"/>
                       <a:r>
-                        <a:rPr lang="en-SA" sz="800" b="0" i="0" u="none" strike="noStrike">
+                        <a:rPr lang="en-SA" sz="800" b="0" i="0" u="none" strike="noStrike" dirty="0">
                           <a:solidFill>
                             <a:srgbClr val="000000"/>
                           </a:solidFill>
                           <a:effectLst/>
                           <a:latin typeface="Aptos Narrow" panose="020B0004020202020204" pitchFamily="34" charset="0"/>
                         </a:rPr>
-                        <a:t>$0 - $1,000,000+</a:t>
+                        <a:t>$0.01 - $1,000,000+</a:t>
                       </a:r>
                     </a:p>
                   </a:txBody>
@@ -14485,7 +14462,7 @@
                     <a:p>
                       <a:pPr algn="l" fontAlgn="b"/>
                       <a:r>
-                        <a:rPr lang="en-SA" sz="800" b="0" i="0" u="none" strike="noStrike">
+                        <a:rPr lang="en-SA" sz="800" b="0" i="0" u="none" strike="noStrike" dirty="0">
                           <a:solidFill>
                             <a:srgbClr val="000000"/>
                           </a:solidFill>
@@ -14560,7 +14537,7 @@
                     <a:p>
                       <a:pPr algn="l" fontAlgn="b"/>
                       <a:r>
-                        <a:rPr lang="en-SA" sz="800" b="0" i="0" u="none" strike="noStrike">
+                        <a:rPr lang="en-SA" sz="800" b="0" i="0" u="none" strike="noStrike" dirty="0">
                           <a:solidFill>
                             <a:srgbClr val="000000"/>
                           </a:solidFill>
@@ -14635,14 +14612,14 @@
                     <a:p>
                       <a:pPr algn="l" fontAlgn="b"/>
                       <a:r>
-                        <a:rPr lang="en-SA" sz="800" b="0" i="0" u="none" strike="noStrike">
+                        <a:rPr lang="en-SA" sz="800" b="0" i="0" u="none" strike="noStrike" dirty="0">
                           <a:solidFill>
                             <a:srgbClr val="000000"/>
                           </a:solidFill>
                           <a:effectLst/>
                           <a:latin typeface="Aptos Narrow" panose="020B0004020202020204" pitchFamily="34" charset="0"/>
                         </a:rPr>
-                        <a:t>$0 - $500,000+</a:t>
+                        <a:t>$0.01 - $500,000+</a:t>
                       </a:r>
                     </a:p>
                   </a:txBody>
@@ -14710,14 +14687,14 @@
                     <a:p>
                       <a:pPr algn="l" fontAlgn="b"/>
                       <a:r>
-                        <a:rPr lang="en-SA" sz="800" b="0" i="0" u="none" strike="noStrike">
+                        <a:rPr lang="en-SA" sz="800" b="0" i="0" u="none" strike="noStrike" dirty="0">
                           <a:solidFill>
                             <a:srgbClr val="000000"/>
                           </a:solidFill>
                           <a:effectLst/>
                           <a:latin typeface="Aptos Narrow" panose="020B0004020202020204" pitchFamily="34" charset="0"/>
                         </a:rPr>
-                        <a:t>0% - 100%</a:t>
+                        <a:t>0.01% - 100%</a:t>
                       </a:r>
                     </a:p>
                   </a:txBody>
@@ -14785,14 +14762,14 @@
                     <a:p>
                       <a:pPr algn="l" fontAlgn="b"/>
                       <a:r>
-                        <a:rPr lang="en-US" sz="800" b="0" i="0" u="none" strike="noStrike">
+                        <a:rPr lang="en-US" sz="800" b="0" i="0" u="none" strike="noStrike" dirty="0">
                           <a:solidFill>
                             <a:srgbClr val="000000"/>
                           </a:solidFill>
                           <a:effectLst/>
                           <a:latin typeface="Aptos Narrow" panose="020B0004020202020204" pitchFamily="34" charset="0"/>
                         </a:rPr>
-                        <a:t>-100% to 100%+</a:t>
+                        <a:t>0% to 200%+</a:t>
                       </a:r>
                     </a:p>
                   </a:txBody>
@@ -14860,14 +14837,14 @@
                     <a:p>
                       <a:pPr algn="l" fontAlgn="b"/>
                       <a:r>
-                        <a:rPr lang="en-SA" sz="800" b="0" i="0" u="none" strike="noStrike">
+                        <a:rPr lang="en-SA" sz="800" b="0" i="0" u="none" strike="noStrike" dirty="0">
                           <a:solidFill>
                             <a:srgbClr val="000000"/>
                           </a:solidFill>
                           <a:effectLst/>
                           <a:latin typeface="Aptos Narrow" panose="020B0004020202020204" pitchFamily="34" charset="0"/>
                         </a:rPr>
-                        <a:t>0% - 100%</a:t>
+                        <a:t>0.01% - 100%</a:t>
                       </a:r>
                     </a:p>
                   </a:txBody>
@@ -14935,14 +14912,14 @@
                     <a:p>
                       <a:pPr algn="l" fontAlgn="b"/>
                       <a:r>
-                        <a:rPr lang="en-SA" sz="800" b="0" i="0" u="none" strike="noStrike">
+                        <a:rPr lang="en-SA" sz="800" b="0" i="0" u="none" strike="noStrike" dirty="0">
                           <a:solidFill>
                             <a:srgbClr val="000000"/>
                           </a:solidFill>
                           <a:effectLst/>
                           <a:latin typeface="Aptos Narrow" panose="020B0004020202020204" pitchFamily="34" charset="0"/>
                         </a:rPr>
-                        <a:t>0 - 100</a:t>
+                        <a:t>0.01 - 100</a:t>
                       </a:r>
                     </a:p>
                   </a:txBody>
@@ -15010,14 +14987,14 @@
                     <a:p>
                       <a:pPr algn="l" fontAlgn="b"/>
                       <a:r>
-                        <a:rPr lang="en-SA" sz="800" b="0" i="0" u="none" strike="noStrike">
+                        <a:rPr lang="en-SA" sz="800" b="0" i="0" u="none" strike="noStrike" dirty="0">
                           <a:solidFill>
                             <a:srgbClr val="000000"/>
                           </a:solidFill>
                           <a:effectLst/>
                           <a:latin typeface="Aptos Narrow" panose="020B0004020202020204" pitchFamily="34" charset="0"/>
                         </a:rPr>
-                        <a:t>0 - 1000</a:t>
+                        <a:t>0.01 - 1000</a:t>
                       </a:r>
                     </a:p>
                   </a:txBody>
@@ -15085,14 +15062,14 @@
                     <a:p>
                       <a:pPr algn="l" fontAlgn="b"/>
                       <a:r>
-                        <a:rPr lang="en-SA" sz="800" b="0" i="0" u="none" strike="noStrike">
+                        <a:rPr lang="en-SA" sz="800" b="0" i="0" u="none" strike="noStrike" dirty="0">
                           <a:solidFill>
                             <a:srgbClr val="000000"/>
                           </a:solidFill>
                           <a:effectLst/>
                           <a:latin typeface="Aptos Narrow" panose="020B0004020202020204" pitchFamily="34" charset="0"/>
                         </a:rPr>
-                        <a:t>$0 - $100,000+</a:t>
+                        <a:t>$0.01 - $100,000+</a:t>
                       </a:r>
                     </a:p>
                   </a:txBody>
@@ -15167,7 +15144,27 @@
                           <a:effectLst/>
                           <a:latin typeface="Aptos Narrow" panose="020B0004020202020204" pitchFamily="34" charset="0"/>
                         </a:rPr>
-                        <a:t>0 - 1000 days</a:t>
+                        <a:t>0</a:t>
+                      </a:r>
+                      <a:r>
+                        <a:rPr lang="en-SA" sz="800" b="0" i="0" u="none" strike="noStrike" dirty="0">
+                          <a:solidFill>
+                            <a:srgbClr val="000000"/>
+                          </a:solidFill>
+                          <a:effectLst/>
+                          <a:latin typeface="Aptos Narrow" panose="020B0004020202020204" pitchFamily="34" charset="0"/>
+                        </a:rPr>
+                        <a:t>.01</a:t>
+                      </a:r>
+                      <a:r>
+                        <a:rPr lang="en-US" sz="800" b="0" i="0" u="none" strike="noStrike" dirty="0">
+                          <a:solidFill>
+                            <a:srgbClr val="000000"/>
+                          </a:solidFill>
+                          <a:effectLst/>
+                          <a:latin typeface="Aptos Narrow" panose="020B0004020202020204" pitchFamily="34" charset="0"/>
+                        </a:rPr>
+                        <a:t> - 1000 days</a:t>
                       </a:r>
                     </a:p>
                   </a:txBody>

</xml_diff>